<commit_message>
sort program flow completed
</commit_message>
<xml_diff>
--- a/sort program flow.pptx
+++ b/sort program flow.pptx
@@ -3103,8 +3103,8 @@
         </p:nvSpPr>
         <p:spPr>
           <a:xfrm>
-            <a:off x="1582072" y="1813374"/>
-            <a:ext cx="914400" cy="312095"/>
+            <a:off x="2349042" y="242142"/>
+            <a:ext cx="1345300" cy="312095"/>
           </a:xfrm>
           <a:prstGeom prst="rect">
             <a:avLst/>
@@ -3142,7 +3142,15 @@
                   <a:schemeClr val="tx1"/>
                 </a:solidFill>
               </a:rPr>
-              <a:t>displayMenu</a:t>
+              <a:t>displayMainMenu</a:t>
+            </a:r>
+            <a:r>
+              <a:rPr lang="en-US" sz="1000" dirty="0" smtClean="0">
+                <a:solidFill>
+                  <a:schemeClr val="tx1"/>
+                </a:solidFill>
+              </a:rPr>
+              <a:t>()</a:t>
             </a:r>
             <a:endParaRPr lang="en-US" sz="1000" dirty="0">
               <a:solidFill>
@@ -3206,6 +3214,1927 @@
                 <a:schemeClr val="tx1"/>
               </a:solidFill>
             </a:endParaRPr>
+          </a:p>
+        </p:txBody>
+      </p:sp>
+      <p:sp>
+        <p:nvSpPr>
+          <p:cNvPr id="6" name="Rectangle 5"/>
+          <p:cNvSpPr/>
+          <p:nvPr/>
+        </p:nvSpPr>
+        <p:spPr>
+          <a:xfrm>
+            <a:off x="2349042" y="1384635"/>
+            <a:ext cx="1345299" cy="312095"/>
+          </a:xfrm>
+          <a:prstGeom prst="rect">
+            <a:avLst/>
+          </a:prstGeom>
+          <a:noFill/>
+          <a:ln>
+            <a:solidFill>
+              <a:schemeClr val="tx1"/>
+            </a:solidFill>
+          </a:ln>
+          <a:effectLst/>
+        </p:spPr>
+        <p:style>
+          <a:lnRef idx="1">
+            <a:schemeClr val="accent1"/>
+          </a:lnRef>
+          <a:fillRef idx="3">
+            <a:schemeClr val="accent1"/>
+          </a:fillRef>
+          <a:effectRef idx="2">
+            <a:schemeClr val="accent1"/>
+          </a:effectRef>
+          <a:fontRef idx="minor">
+            <a:schemeClr val="lt1"/>
+          </a:fontRef>
+        </p:style>
+        <p:txBody>
+          <a:bodyPr rtlCol="0" anchor="ctr"/>
+          <a:lstStyle/>
+          <a:p>
+            <a:pPr algn="ctr"/>
+            <a:r>
+              <a:rPr lang="en-US" sz="1000" dirty="0" err="1" smtClean="0">
+                <a:solidFill>
+                  <a:schemeClr val="tx1"/>
+                </a:solidFill>
+              </a:rPr>
+              <a:t>generateArray</a:t>
+            </a:r>
+            <a:r>
+              <a:rPr lang="en-US" sz="1000" dirty="0" smtClean="0">
+                <a:solidFill>
+                  <a:schemeClr val="tx1"/>
+                </a:solidFill>
+              </a:rPr>
+              <a:t>()</a:t>
+            </a:r>
+            <a:endParaRPr lang="en-US" sz="1000" dirty="0">
+              <a:solidFill>
+                <a:schemeClr val="tx1"/>
+              </a:solidFill>
+            </a:endParaRPr>
+          </a:p>
+        </p:txBody>
+      </p:sp>
+      <p:sp>
+        <p:nvSpPr>
+          <p:cNvPr id="7" name="Rectangle 6"/>
+          <p:cNvSpPr/>
+          <p:nvPr/>
+        </p:nvSpPr>
+        <p:spPr>
+          <a:xfrm>
+            <a:off x="4619907" y="242142"/>
+            <a:ext cx="1345299" cy="312095"/>
+          </a:xfrm>
+          <a:prstGeom prst="rect">
+            <a:avLst/>
+          </a:prstGeom>
+          <a:noFill/>
+          <a:ln>
+            <a:solidFill>
+              <a:schemeClr val="tx1"/>
+            </a:solidFill>
+          </a:ln>
+          <a:effectLst/>
+        </p:spPr>
+        <p:style>
+          <a:lnRef idx="1">
+            <a:schemeClr val="accent1"/>
+          </a:lnRef>
+          <a:fillRef idx="3">
+            <a:schemeClr val="accent1"/>
+          </a:fillRef>
+          <a:effectRef idx="2">
+            <a:schemeClr val="accent1"/>
+          </a:effectRef>
+          <a:fontRef idx="minor">
+            <a:schemeClr val="lt1"/>
+          </a:fontRef>
+        </p:style>
+        <p:txBody>
+          <a:bodyPr rtlCol="0" anchor="ctr"/>
+          <a:lstStyle/>
+          <a:p>
+            <a:pPr algn="ctr"/>
+            <a:r>
+              <a:rPr lang="en-US" sz="1000" dirty="0" err="1" smtClean="0">
+                <a:solidFill>
+                  <a:schemeClr val="tx1"/>
+                </a:solidFill>
+              </a:rPr>
+              <a:t>getInput</a:t>
+            </a:r>
+            <a:r>
+              <a:rPr lang="en-US" sz="1000" dirty="0" smtClean="0">
+                <a:solidFill>
+                  <a:schemeClr val="tx1"/>
+                </a:solidFill>
+              </a:rPr>
+              <a:t>(): </a:t>
+            </a:r>
+            <a:r>
+              <a:rPr lang="en-US" sz="1000" dirty="0" err="1" smtClean="0">
+                <a:solidFill>
+                  <a:schemeClr val="tx1"/>
+                </a:solidFill>
+              </a:rPr>
+              <a:t>int</a:t>
+            </a:r>
+            <a:endParaRPr lang="en-US" sz="1000" dirty="0">
+              <a:solidFill>
+                <a:schemeClr val="tx1"/>
+              </a:solidFill>
+            </a:endParaRPr>
+          </a:p>
+        </p:txBody>
+      </p:sp>
+      <p:sp>
+        <p:nvSpPr>
+          <p:cNvPr id="10" name="Rectangle 9"/>
+          <p:cNvSpPr/>
+          <p:nvPr/>
+        </p:nvSpPr>
+        <p:spPr>
+          <a:xfrm>
+            <a:off x="4619907" y="1384635"/>
+            <a:ext cx="1345299" cy="312095"/>
+          </a:xfrm>
+          <a:prstGeom prst="rect">
+            <a:avLst/>
+          </a:prstGeom>
+          <a:noFill/>
+          <a:ln>
+            <a:solidFill>
+              <a:schemeClr val="tx1"/>
+            </a:solidFill>
+          </a:ln>
+          <a:effectLst/>
+        </p:spPr>
+        <p:style>
+          <a:lnRef idx="1">
+            <a:schemeClr val="accent1"/>
+          </a:lnRef>
+          <a:fillRef idx="3">
+            <a:schemeClr val="accent1"/>
+          </a:fillRef>
+          <a:effectRef idx="2">
+            <a:schemeClr val="accent1"/>
+          </a:effectRef>
+          <a:fontRef idx="minor">
+            <a:schemeClr val="lt1"/>
+          </a:fontRef>
+        </p:style>
+        <p:txBody>
+          <a:bodyPr rtlCol="0" anchor="ctr"/>
+          <a:lstStyle/>
+          <a:p>
+            <a:pPr algn="ctr"/>
+            <a:r>
+              <a:rPr lang="en-US" sz="1000" dirty="0" err="1" smtClean="0">
+                <a:solidFill>
+                  <a:schemeClr val="tx1"/>
+                </a:solidFill>
+              </a:rPr>
+              <a:t>getRandInt</a:t>
+            </a:r>
+            <a:r>
+              <a:rPr lang="en-US" sz="1000" dirty="0" smtClean="0">
+                <a:solidFill>
+                  <a:schemeClr val="tx1"/>
+                </a:solidFill>
+              </a:rPr>
+              <a:t>()</a:t>
+            </a:r>
+            <a:endParaRPr lang="en-US" sz="1000" dirty="0">
+              <a:solidFill>
+                <a:schemeClr val="tx1"/>
+              </a:solidFill>
+            </a:endParaRPr>
+          </a:p>
+        </p:txBody>
+      </p:sp>
+      <p:cxnSp>
+        <p:nvCxnSpPr>
+          <p:cNvPr id="12" name="Elbow Connector 11"/>
+          <p:cNvCxnSpPr>
+            <a:stCxn id="4" idx="3"/>
+            <a:endCxn id="7" idx="1"/>
+          </p:cNvCxnSpPr>
+          <p:nvPr/>
+        </p:nvCxnSpPr>
+        <p:spPr>
+          <a:xfrm>
+            <a:off x="3694342" y="398190"/>
+            <a:ext cx="925565" cy="12700"/>
+          </a:xfrm>
+          <a:prstGeom prst="bentConnector3">
+            <a:avLst/>
+          </a:prstGeom>
+          <a:ln w="12700" cmpd="sng">
+            <a:solidFill>
+              <a:srgbClr val="000000"/>
+            </a:solidFill>
+          </a:ln>
+          <a:effectLst/>
+        </p:spPr>
+        <p:style>
+          <a:lnRef idx="2">
+            <a:schemeClr val="accent1"/>
+          </a:lnRef>
+          <a:fillRef idx="0">
+            <a:schemeClr val="accent1"/>
+          </a:fillRef>
+          <a:effectRef idx="1">
+            <a:schemeClr val="accent1"/>
+          </a:effectRef>
+          <a:fontRef idx="minor">
+            <a:schemeClr val="tx1"/>
+          </a:fontRef>
+        </p:style>
+      </p:cxnSp>
+      <p:sp>
+        <p:nvSpPr>
+          <p:cNvPr id="13" name="TextBox 12"/>
+          <p:cNvSpPr txBox="1"/>
+          <p:nvPr/>
+        </p:nvSpPr>
+        <p:spPr>
+          <a:xfrm>
+            <a:off x="3784147" y="215445"/>
+            <a:ext cx="939680" cy="338554"/>
+          </a:xfrm>
+          <a:prstGeom prst="rect">
+            <a:avLst/>
+          </a:prstGeom>
+          <a:noFill/>
+        </p:spPr>
+        <p:txBody>
+          <a:bodyPr wrap="none" rtlCol="0">
+            <a:spAutoFit/>
+          </a:bodyPr>
+          <a:lstStyle/>
+          <a:p>
+            <a:r>
+              <a:rPr lang="en-US" sz="800" dirty="0" smtClean="0"/>
+              <a:t>1. get sort choices</a:t>
+            </a:r>
+          </a:p>
+          <a:p>
+            <a:r>
+              <a:rPr lang="en-US" sz="800" dirty="0" smtClean="0"/>
+              <a:t>2. get loop count</a:t>
+            </a:r>
+            <a:endParaRPr lang="en-US" sz="800" dirty="0"/>
+          </a:p>
+        </p:txBody>
+      </p:sp>
+      <p:sp>
+        <p:nvSpPr>
+          <p:cNvPr id="14" name="TextBox 13"/>
+          <p:cNvSpPr txBox="1"/>
+          <p:nvPr/>
+        </p:nvSpPr>
+        <p:spPr>
+          <a:xfrm>
+            <a:off x="3151286" y="1036610"/>
+            <a:ext cx="1468621" cy="338554"/>
+          </a:xfrm>
+          <a:prstGeom prst="rect">
+            <a:avLst/>
+          </a:prstGeom>
+          <a:noFill/>
+        </p:spPr>
+        <p:txBody>
+          <a:bodyPr wrap="none" rtlCol="0">
+            <a:spAutoFit/>
+          </a:bodyPr>
+          <a:lstStyle/>
+          <a:p>
+            <a:r>
+              <a:rPr lang="en-US" sz="800" dirty="0" smtClean="0"/>
+              <a:t>Used to create each sort array </a:t>
+            </a:r>
+          </a:p>
+          <a:p>
+            <a:r>
+              <a:rPr lang="en-US" sz="800" dirty="0" smtClean="0"/>
+              <a:t>Used to create each time array</a:t>
+            </a:r>
+            <a:endParaRPr lang="en-US" sz="800" dirty="0"/>
+          </a:p>
+        </p:txBody>
+      </p:sp>
+      <p:sp>
+        <p:nvSpPr>
+          <p:cNvPr id="15" name="TextBox 14"/>
+          <p:cNvSpPr txBox="1"/>
+          <p:nvPr/>
+        </p:nvSpPr>
+        <p:spPr>
+          <a:xfrm>
+            <a:off x="3323591" y="2350254"/>
+            <a:ext cx="184666" cy="369332"/>
+          </a:xfrm>
+          <a:prstGeom prst="rect">
+            <a:avLst/>
+          </a:prstGeom>
+          <a:noFill/>
+        </p:spPr>
+        <p:txBody>
+          <a:bodyPr wrap="none" rtlCol="0">
+            <a:spAutoFit/>
+          </a:bodyPr>
+          <a:lstStyle/>
+          <a:p>
+            <a:endParaRPr lang="en-US" dirty="0"/>
+          </a:p>
+        </p:txBody>
+      </p:sp>
+      <p:cxnSp>
+        <p:nvCxnSpPr>
+          <p:cNvPr id="16" name="Elbow Connector 15"/>
+          <p:cNvCxnSpPr>
+            <a:stCxn id="31" idx="3"/>
+            <a:endCxn id="10" idx="1"/>
+          </p:cNvCxnSpPr>
+          <p:nvPr/>
+        </p:nvCxnSpPr>
+        <p:spPr>
+          <a:xfrm flipV="1">
+            <a:off x="3694342" y="1540683"/>
+            <a:ext cx="925565" cy="653524"/>
+          </a:xfrm>
+          <a:prstGeom prst="bentConnector3">
+            <a:avLst/>
+          </a:prstGeom>
+          <a:ln w="12700" cmpd="sng">
+            <a:solidFill>
+              <a:srgbClr val="000000"/>
+            </a:solidFill>
+          </a:ln>
+          <a:effectLst/>
+        </p:spPr>
+        <p:style>
+          <a:lnRef idx="2">
+            <a:schemeClr val="accent1"/>
+          </a:lnRef>
+          <a:fillRef idx="0">
+            <a:schemeClr val="accent1"/>
+          </a:fillRef>
+          <a:effectRef idx="1">
+            <a:schemeClr val="accent1"/>
+          </a:effectRef>
+          <a:fontRef idx="minor">
+            <a:schemeClr val="tx1"/>
+          </a:fontRef>
+        </p:style>
+      </p:cxnSp>
+      <p:sp>
+        <p:nvSpPr>
+          <p:cNvPr id="20" name="Rectangle 19"/>
+          <p:cNvSpPr/>
+          <p:nvPr/>
+        </p:nvSpPr>
+        <p:spPr>
+          <a:xfrm>
+            <a:off x="2629835" y="2962497"/>
+            <a:ext cx="774681" cy="312095"/>
+          </a:xfrm>
+          <a:prstGeom prst="rect">
+            <a:avLst/>
+          </a:prstGeom>
+          <a:noFill/>
+          <a:ln>
+            <a:solidFill>
+              <a:schemeClr val="tx1"/>
+            </a:solidFill>
+          </a:ln>
+          <a:effectLst/>
+        </p:spPr>
+        <p:style>
+          <a:lnRef idx="1">
+            <a:schemeClr val="accent1"/>
+          </a:lnRef>
+          <a:fillRef idx="3">
+            <a:schemeClr val="accent1"/>
+          </a:fillRef>
+          <a:effectRef idx="2">
+            <a:schemeClr val="accent1"/>
+          </a:effectRef>
+          <a:fontRef idx="minor">
+            <a:schemeClr val="lt1"/>
+          </a:fontRef>
+        </p:style>
+        <p:txBody>
+          <a:bodyPr rtlCol="0" anchor="ctr"/>
+          <a:lstStyle/>
+          <a:p>
+            <a:pPr algn="ctr"/>
+            <a:r>
+              <a:rPr lang="en-US" sz="1000" dirty="0" err="1" smtClean="0">
+                <a:solidFill>
+                  <a:schemeClr val="tx1"/>
+                </a:solidFill>
+              </a:rPr>
+              <a:t>pickSort</a:t>
+            </a:r>
+            <a:r>
+              <a:rPr lang="en-US" sz="1000" dirty="0" smtClean="0">
+                <a:solidFill>
+                  <a:schemeClr val="tx1"/>
+                </a:solidFill>
+              </a:rPr>
+              <a:t>()</a:t>
+            </a:r>
+            <a:endParaRPr lang="en-US" sz="1000" dirty="0">
+              <a:solidFill>
+                <a:schemeClr val="tx1"/>
+              </a:solidFill>
+            </a:endParaRPr>
+          </a:p>
+        </p:txBody>
+      </p:sp>
+      <p:sp>
+        <p:nvSpPr>
+          <p:cNvPr id="21" name="Rectangle 20"/>
+          <p:cNvSpPr/>
+          <p:nvPr/>
+        </p:nvSpPr>
+        <p:spPr>
+          <a:xfrm>
+            <a:off x="4872287" y="2161864"/>
+            <a:ext cx="983172" cy="312095"/>
+          </a:xfrm>
+          <a:prstGeom prst="rect">
+            <a:avLst/>
+          </a:prstGeom>
+          <a:noFill/>
+          <a:ln>
+            <a:solidFill>
+              <a:schemeClr val="tx1"/>
+            </a:solidFill>
+          </a:ln>
+          <a:effectLst/>
+        </p:spPr>
+        <p:style>
+          <a:lnRef idx="1">
+            <a:schemeClr val="accent1"/>
+          </a:lnRef>
+          <a:fillRef idx="3">
+            <a:schemeClr val="accent1"/>
+          </a:fillRef>
+          <a:effectRef idx="2">
+            <a:schemeClr val="accent1"/>
+          </a:effectRef>
+          <a:fontRef idx="minor">
+            <a:schemeClr val="lt1"/>
+          </a:fontRef>
+        </p:style>
+        <p:txBody>
+          <a:bodyPr rtlCol="0" anchor="ctr"/>
+          <a:lstStyle/>
+          <a:p>
+            <a:pPr algn="ctr"/>
+            <a:r>
+              <a:rPr lang="en-US" sz="1000" dirty="0" err="1" smtClean="0">
+                <a:solidFill>
+                  <a:schemeClr val="tx1"/>
+                </a:solidFill>
+              </a:rPr>
+              <a:t>bubbleSort</a:t>
+            </a:r>
+            <a:r>
+              <a:rPr lang="en-US" sz="1000" dirty="0" smtClean="0">
+                <a:solidFill>
+                  <a:schemeClr val="tx1"/>
+                </a:solidFill>
+              </a:rPr>
+              <a:t>()</a:t>
+            </a:r>
+            <a:endParaRPr lang="en-US" sz="1000" dirty="0">
+              <a:solidFill>
+                <a:schemeClr val="tx1"/>
+              </a:solidFill>
+            </a:endParaRPr>
+          </a:p>
+        </p:txBody>
+      </p:sp>
+      <p:sp>
+        <p:nvSpPr>
+          <p:cNvPr id="22" name="Rectangle 21"/>
+          <p:cNvSpPr/>
+          <p:nvPr/>
+        </p:nvSpPr>
+        <p:spPr>
+          <a:xfrm>
+            <a:off x="4872287" y="2687243"/>
+            <a:ext cx="983172" cy="312095"/>
+          </a:xfrm>
+          <a:prstGeom prst="rect">
+            <a:avLst/>
+          </a:prstGeom>
+          <a:noFill/>
+          <a:ln>
+            <a:solidFill>
+              <a:schemeClr val="tx1"/>
+            </a:solidFill>
+          </a:ln>
+          <a:effectLst/>
+        </p:spPr>
+        <p:style>
+          <a:lnRef idx="1">
+            <a:schemeClr val="accent1"/>
+          </a:lnRef>
+          <a:fillRef idx="3">
+            <a:schemeClr val="accent1"/>
+          </a:fillRef>
+          <a:effectRef idx="2">
+            <a:schemeClr val="accent1"/>
+          </a:effectRef>
+          <a:fontRef idx="minor">
+            <a:schemeClr val="lt1"/>
+          </a:fontRef>
+        </p:style>
+        <p:txBody>
+          <a:bodyPr rtlCol="0" anchor="ctr"/>
+          <a:lstStyle/>
+          <a:p>
+            <a:pPr algn="ctr"/>
+            <a:r>
+              <a:rPr lang="en-US" sz="1000" dirty="0" err="1" smtClean="0">
+                <a:solidFill>
+                  <a:schemeClr val="tx1"/>
+                </a:solidFill>
+              </a:rPr>
+              <a:t>mergeSort</a:t>
+            </a:r>
+            <a:r>
+              <a:rPr lang="en-US" sz="1000" dirty="0" smtClean="0">
+                <a:solidFill>
+                  <a:schemeClr val="tx1"/>
+                </a:solidFill>
+              </a:rPr>
+              <a:t>()</a:t>
+            </a:r>
+            <a:endParaRPr lang="en-US" sz="1000" dirty="0">
+              <a:solidFill>
+                <a:schemeClr val="tx1"/>
+              </a:solidFill>
+            </a:endParaRPr>
+          </a:p>
+        </p:txBody>
+      </p:sp>
+      <p:sp>
+        <p:nvSpPr>
+          <p:cNvPr id="23" name="Rectangle 22"/>
+          <p:cNvSpPr/>
+          <p:nvPr/>
+        </p:nvSpPr>
+        <p:spPr>
+          <a:xfrm>
+            <a:off x="4872287" y="3242250"/>
+            <a:ext cx="983172" cy="312095"/>
+          </a:xfrm>
+          <a:prstGeom prst="rect">
+            <a:avLst/>
+          </a:prstGeom>
+          <a:noFill/>
+          <a:ln>
+            <a:solidFill>
+              <a:schemeClr val="tx1"/>
+            </a:solidFill>
+          </a:ln>
+          <a:effectLst/>
+        </p:spPr>
+        <p:style>
+          <a:lnRef idx="1">
+            <a:schemeClr val="accent1"/>
+          </a:lnRef>
+          <a:fillRef idx="3">
+            <a:schemeClr val="accent1"/>
+          </a:fillRef>
+          <a:effectRef idx="2">
+            <a:schemeClr val="accent1"/>
+          </a:effectRef>
+          <a:fontRef idx="minor">
+            <a:schemeClr val="lt1"/>
+          </a:fontRef>
+        </p:style>
+        <p:txBody>
+          <a:bodyPr rtlCol="0" anchor="ctr"/>
+          <a:lstStyle/>
+          <a:p>
+            <a:pPr algn="ctr"/>
+            <a:r>
+              <a:rPr lang="en-US" sz="1000" dirty="0" err="1" smtClean="0">
+                <a:solidFill>
+                  <a:schemeClr val="tx1"/>
+                </a:solidFill>
+              </a:rPr>
+              <a:t>insertionSort</a:t>
+            </a:r>
+            <a:r>
+              <a:rPr lang="en-US" sz="1000" dirty="0" smtClean="0">
+                <a:solidFill>
+                  <a:schemeClr val="tx1"/>
+                </a:solidFill>
+              </a:rPr>
+              <a:t>()</a:t>
+            </a:r>
+            <a:endParaRPr lang="en-US" sz="1000" dirty="0">
+              <a:solidFill>
+                <a:schemeClr val="tx1"/>
+              </a:solidFill>
+            </a:endParaRPr>
+          </a:p>
+        </p:txBody>
+      </p:sp>
+      <p:sp>
+        <p:nvSpPr>
+          <p:cNvPr id="27" name="Rectangle 26"/>
+          <p:cNvSpPr/>
+          <p:nvPr/>
+        </p:nvSpPr>
+        <p:spPr>
+          <a:xfrm>
+            <a:off x="4872287" y="3795266"/>
+            <a:ext cx="983172" cy="312095"/>
+          </a:xfrm>
+          <a:prstGeom prst="rect">
+            <a:avLst/>
+          </a:prstGeom>
+          <a:noFill/>
+          <a:ln>
+            <a:solidFill>
+              <a:schemeClr val="tx1"/>
+            </a:solidFill>
+          </a:ln>
+          <a:effectLst/>
+        </p:spPr>
+        <p:style>
+          <a:lnRef idx="1">
+            <a:schemeClr val="accent1"/>
+          </a:lnRef>
+          <a:fillRef idx="3">
+            <a:schemeClr val="accent1"/>
+          </a:fillRef>
+          <a:effectRef idx="2">
+            <a:schemeClr val="accent1"/>
+          </a:effectRef>
+          <a:fontRef idx="minor">
+            <a:schemeClr val="lt1"/>
+          </a:fontRef>
+        </p:style>
+        <p:txBody>
+          <a:bodyPr rtlCol="0" anchor="ctr"/>
+          <a:lstStyle/>
+          <a:p>
+            <a:pPr algn="ctr"/>
+            <a:r>
+              <a:rPr lang="en-US" sz="1000" dirty="0" err="1" smtClean="0">
+                <a:solidFill>
+                  <a:schemeClr val="tx1"/>
+                </a:solidFill>
+              </a:rPr>
+              <a:t>quickSort</a:t>
+            </a:r>
+            <a:r>
+              <a:rPr lang="en-US" sz="1000" dirty="0" smtClean="0">
+                <a:solidFill>
+                  <a:schemeClr val="tx1"/>
+                </a:solidFill>
+              </a:rPr>
+              <a:t>()</a:t>
+            </a:r>
+            <a:endParaRPr lang="en-US" sz="1000" dirty="0">
+              <a:solidFill>
+                <a:schemeClr val="tx1"/>
+              </a:solidFill>
+            </a:endParaRPr>
+          </a:p>
+        </p:txBody>
+      </p:sp>
+      <p:cxnSp>
+        <p:nvCxnSpPr>
+          <p:cNvPr id="28" name="Elbow Connector 27"/>
+          <p:cNvCxnSpPr>
+            <a:stCxn id="5" idx="3"/>
+            <a:endCxn id="20" idx="1"/>
+          </p:cNvCxnSpPr>
+          <p:nvPr/>
+        </p:nvCxnSpPr>
+        <p:spPr>
+          <a:xfrm flipV="1">
+            <a:off x="1131375" y="3118545"/>
+            <a:ext cx="1498460" cy="144034"/>
+          </a:xfrm>
+          <a:prstGeom prst="bentConnector3">
+            <a:avLst>
+              <a:gd name="adj1" fmla="val 50000"/>
+            </a:avLst>
+          </a:prstGeom>
+          <a:ln w="12700" cmpd="sng">
+            <a:solidFill>
+              <a:srgbClr val="000000"/>
+            </a:solidFill>
+          </a:ln>
+          <a:effectLst/>
+        </p:spPr>
+        <p:style>
+          <a:lnRef idx="2">
+            <a:schemeClr val="accent1"/>
+          </a:lnRef>
+          <a:fillRef idx="0">
+            <a:schemeClr val="accent1"/>
+          </a:fillRef>
+          <a:effectRef idx="1">
+            <a:schemeClr val="accent1"/>
+          </a:effectRef>
+          <a:fontRef idx="minor">
+            <a:schemeClr val="tx1"/>
+          </a:fontRef>
+        </p:style>
+      </p:cxnSp>
+      <p:sp>
+        <p:nvSpPr>
+          <p:cNvPr id="31" name="Rectangle 30"/>
+          <p:cNvSpPr/>
+          <p:nvPr/>
+        </p:nvSpPr>
+        <p:spPr>
+          <a:xfrm>
+            <a:off x="2349043" y="2038159"/>
+            <a:ext cx="1345299" cy="312095"/>
+          </a:xfrm>
+          <a:prstGeom prst="rect">
+            <a:avLst/>
+          </a:prstGeom>
+          <a:noFill/>
+          <a:ln>
+            <a:solidFill>
+              <a:schemeClr val="tx1"/>
+            </a:solidFill>
+          </a:ln>
+          <a:effectLst/>
+        </p:spPr>
+        <p:style>
+          <a:lnRef idx="1">
+            <a:schemeClr val="accent1"/>
+          </a:lnRef>
+          <a:fillRef idx="3">
+            <a:schemeClr val="accent1"/>
+          </a:fillRef>
+          <a:effectRef idx="2">
+            <a:schemeClr val="accent1"/>
+          </a:effectRef>
+          <a:fontRef idx="minor">
+            <a:schemeClr val="lt1"/>
+          </a:fontRef>
+        </p:style>
+        <p:txBody>
+          <a:bodyPr rtlCol="0" anchor="ctr"/>
+          <a:lstStyle/>
+          <a:p>
+            <a:pPr algn="ctr"/>
+            <a:r>
+              <a:rPr lang="en-US" sz="1000" dirty="0" err="1" smtClean="0">
+                <a:solidFill>
+                  <a:schemeClr val="tx1"/>
+                </a:solidFill>
+              </a:rPr>
+              <a:t>fillRandomArray</a:t>
+            </a:r>
+            <a:r>
+              <a:rPr lang="en-US" sz="1000" dirty="0" smtClean="0">
+                <a:solidFill>
+                  <a:schemeClr val="tx1"/>
+                </a:solidFill>
+              </a:rPr>
+              <a:t>()</a:t>
+            </a:r>
+            <a:endParaRPr lang="en-US" sz="1000" dirty="0">
+              <a:solidFill>
+                <a:schemeClr val="tx1"/>
+              </a:solidFill>
+            </a:endParaRPr>
+          </a:p>
+        </p:txBody>
+      </p:sp>
+      <p:cxnSp>
+        <p:nvCxnSpPr>
+          <p:cNvPr id="33" name="Elbow Connector 32"/>
+          <p:cNvCxnSpPr>
+            <a:stCxn id="5" idx="3"/>
+            <a:endCxn id="4" idx="1"/>
+          </p:cNvCxnSpPr>
+          <p:nvPr/>
+        </p:nvCxnSpPr>
+        <p:spPr>
+          <a:xfrm flipV="1">
+            <a:off x="1131375" y="398190"/>
+            <a:ext cx="1217667" cy="2864389"/>
+          </a:xfrm>
+          <a:prstGeom prst="bentConnector3">
+            <a:avLst>
+              <a:gd name="adj1" fmla="val 50000"/>
+            </a:avLst>
+          </a:prstGeom>
+          <a:ln w="12700" cmpd="sng">
+            <a:solidFill>
+              <a:srgbClr val="000000"/>
+            </a:solidFill>
+          </a:ln>
+          <a:effectLst/>
+        </p:spPr>
+        <p:style>
+          <a:lnRef idx="2">
+            <a:schemeClr val="accent1"/>
+          </a:lnRef>
+          <a:fillRef idx="0">
+            <a:schemeClr val="accent1"/>
+          </a:fillRef>
+          <a:effectRef idx="1">
+            <a:schemeClr val="accent1"/>
+          </a:effectRef>
+          <a:fontRef idx="minor">
+            <a:schemeClr val="tx1"/>
+          </a:fontRef>
+        </p:style>
+      </p:cxnSp>
+      <p:sp>
+        <p:nvSpPr>
+          <p:cNvPr id="36" name="TextBox 35"/>
+          <p:cNvSpPr txBox="1"/>
+          <p:nvPr/>
+        </p:nvSpPr>
+        <p:spPr>
+          <a:xfrm>
+            <a:off x="711922" y="678763"/>
+            <a:ext cx="1399341" cy="584776"/>
+          </a:xfrm>
+          <a:prstGeom prst="rect">
+            <a:avLst/>
+          </a:prstGeom>
+          <a:noFill/>
+        </p:spPr>
+        <p:txBody>
+          <a:bodyPr wrap="square" rtlCol="0">
+            <a:spAutoFit/>
+          </a:bodyPr>
+          <a:lstStyle/>
+          <a:p>
+            <a:r>
+              <a:rPr lang="en-US" sz="800" dirty="0" smtClean="0"/>
+              <a:t>&lt;- 3 digit integer that has the first  and second choice of sort and  the number of of loops</a:t>
+            </a:r>
+            <a:endParaRPr lang="en-US" sz="800" dirty="0"/>
+          </a:p>
+        </p:txBody>
+      </p:sp>
+      <p:cxnSp>
+        <p:nvCxnSpPr>
+          <p:cNvPr id="37" name="Elbow Connector 36"/>
+          <p:cNvCxnSpPr>
+            <a:stCxn id="5" idx="3"/>
+            <a:endCxn id="6" idx="1"/>
+          </p:cNvCxnSpPr>
+          <p:nvPr/>
+        </p:nvCxnSpPr>
+        <p:spPr>
+          <a:xfrm flipV="1">
+            <a:off x="1131375" y="1540683"/>
+            <a:ext cx="1217667" cy="1721896"/>
+          </a:xfrm>
+          <a:prstGeom prst="bentConnector3">
+            <a:avLst>
+              <a:gd name="adj1" fmla="val 50000"/>
+            </a:avLst>
+          </a:prstGeom>
+          <a:ln w="12700" cmpd="sng">
+            <a:solidFill>
+              <a:srgbClr val="000000"/>
+            </a:solidFill>
+          </a:ln>
+          <a:effectLst/>
+        </p:spPr>
+        <p:style>
+          <a:lnRef idx="2">
+            <a:schemeClr val="accent1"/>
+          </a:lnRef>
+          <a:fillRef idx="0">
+            <a:schemeClr val="accent1"/>
+          </a:fillRef>
+          <a:effectRef idx="1">
+            <a:schemeClr val="accent1"/>
+          </a:effectRef>
+          <a:fontRef idx="minor">
+            <a:schemeClr val="tx1"/>
+          </a:fontRef>
+        </p:style>
+      </p:cxnSp>
+      <p:sp>
+        <p:nvSpPr>
+          <p:cNvPr id="40" name="TextBox 39"/>
+          <p:cNvSpPr txBox="1"/>
+          <p:nvPr/>
+        </p:nvSpPr>
+        <p:spPr>
+          <a:xfrm>
+            <a:off x="1862146" y="1303358"/>
+            <a:ext cx="441898" cy="215444"/>
+          </a:xfrm>
+          <a:prstGeom prst="rect">
+            <a:avLst/>
+          </a:prstGeom>
+          <a:noFill/>
+        </p:spPr>
+        <p:txBody>
+          <a:bodyPr wrap="none" rtlCol="0">
+            <a:spAutoFit/>
+          </a:bodyPr>
+          <a:lstStyle/>
+          <a:p>
+            <a:r>
+              <a:rPr lang="en-US" sz="800" dirty="0" smtClean="0"/>
+              <a:t>-&gt;</a:t>
+            </a:r>
+            <a:r>
+              <a:rPr lang="en-US" sz="800" dirty="0" err="1" smtClean="0"/>
+              <a:t>int</a:t>
+            </a:r>
+            <a:r>
+              <a:rPr lang="en-US" sz="800" dirty="0" smtClean="0"/>
+              <a:t>[]</a:t>
+            </a:r>
+            <a:endParaRPr lang="en-US" sz="800" dirty="0"/>
+          </a:p>
+        </p:txBody>
+      </p:sp>
+      <p:sp>
+        <p:nvSpPr>
+          <p:cNvPr id="41" name="TextBox 40"/>
+          <p:cNvSpPr txBox="1"/>
+          <p:nvPr/>
+        </p:nvSpPr>
+        <p:spPr>
+          <a:xfrm>
+            <a:off x="3694342" y="1978763"/>
+            <a:ext cx="402173" cy="215444"/>
+          </a:xfrm>
+          <a:prstGeom prst="rect">
+            <a:avLst/>
+          </a:prstGeom>
+          <a:noFill/>
+        </p:spPr>
+        <p:txBody>
+          <a:bodyPr wrap="none" rtlCol="0">
+            <a:spAutoFit/>
+          </a:bodyPr>
+          <a:lstStyle/>
+          <a:p>
+            <a:r>
+              <a:rPr lang="en-US" sz="800" dirty="0" smtClean="0"/>
+              <a:t>&lt;- </a:t>
+            </a:r>
+            <a:r>
+              <a:rPr lang="en-US" sz="800" dirty="0" err="1" smtClean="0"/>
+              <a:t>int</a:t>
+            </a:r>
+            <a:endParaRPr lang="en-US" sz="800" dirty="0"/>
+          </a:p>
+        </p:txBody>
+      </p:sp>
+      <p:cxnSp>
+        <p:nvCxnSpPr>
+          <p:cNvPr id="42" name="Elbow Connector 41"/>
+          <p:cNvCxnSpPr>
+            <a:stCxn id="5" idx="3"/>
+            <a:endCxn id="31" idx="1"/>
+          </p:cNvCxnSpPr>
+          <p:nvPr/>
+        </p:nvCxnSpPr>
+        <p:spPr>
+          <a:xfrm flipV="1">
+            <a:off x="1131375" y="2194207"/>
+            <a:ext cx="1217668" cy="1068372"/>
+          </a:xfrm>
+          <a:prstGeom prst="bentConnector3">
+            <a:avLst>
+              <a:gd name="adj1" fmla="val 50000"/>
+            </a:avLst>
+          </a:prstGeom>
+          <a:ln w="12700" cmpd="sng">
+            <a:solidFill>
+              <a:srgbClr val="000000"/>
+            </a:solidFill>
+          </a:ln>
+          <a:effectLst/>
+        </p:spPr>
+        <p:style>
+          <a:lnRef idx="2">
+            <a:schemeClr val="accent1"/>
+          </a:lnRef>
+          <a:fillRef idx="0">
+            <a:schemeClr val="accent1"/>
+          </a:fillRef>
+          <a:effectRef idx="1">
+            <a:schemeClr val="accent1"/>
+          </a:effectRef>
+          <a:fontRef idx="minor">
+            <a:schemeClr val="tx1"/>
+          </a:fontRef>
+        </p:style>
+      </p:cxnSp>
+      <p:sp>
+        <p:nvSpPr>
+          <p:cNvPr id="46" name="TextBox 45"/>
+          <p:cNvSpPr txBox="1"/>
+          <p:nvPr/>
+        </p:nvSpPr>
+        <p:spPr>
+          <a:xfrm>
+            <a:off x="1862146" y="1984171"/>
+            <a:ext cx="441898" cy="215444"/>
+          </a:xfrm>
+          <a:prstGeom prst="rect">
+            <a:avLst/>
+          </a:prstGeom>
+          <a:noFill/>
+        </p:spPr>
+        <p:txBody>
+          <a:bodyPr wrap="none" rtlCol="0">
+            <a:spAutoFit/>
+          </a:bodyPr>
+          <a:lstStyle/>
+          <a:p>
+            <a:r>
+              <a:rPr lang="en-US" sz="800" dirty="0" smtClean="0"/>
+              <a:t>-&gt;</a:t>
+            </a:r>
+            <a:r>
+              <a:rPr lang="en-US" sz="800" dirty="0" err="1" smtClean="0"/>
+              <a:t>int</a:t>
+            </a:r>
+            <a:r>
+              <a:rPr lang="en-US" sz="800" dirty="0" smtClean="0"/>
+              <a:t>[]</a:t>
+            </a:r>
+            <a:endParaRPr lang="en-US" sz="800" dirty="0"/>
+          </a:p>
+        </p:txBody>
+      </p:sp>
+      <p:sp>
+        <p:nvSpPr>
+          <p:cNvPr id="47" name="TextBox 46"/>
+          <p:cNvSpPr txBox="1"/>
+          <p:nvPr/>
+        </p:nvSpPr>
+        <p:spPr>
+          <a:xfrm>
+            <a:off x="1839689" y="3118545"/>
+            <a:ext cx="879117" cy="461665"/>
+          </a:xfrm>
+          <a:prstGeom prst="rect">
+            <a:avLst/>
+          </a:prstGeom>
+          <a:noFill/>
+        </p:spPr>
+        <p:txBody>
+          <a:bodyPr wrap="none" rtlCol="0">
+            <a:spAutoFit/>
+          </a:bodyPr>
+          <a:lstStyle/>
+          <a:p>
+            <a:r>
+              <a:rPr lang="en-US" sz="800" dirty="0" smtClean="0"/>
+              <a:t>-&gt; </a:t>
+            </a:r>
+            <a:r>
+              <a:rPr lang="en-US" sz="800" dirty="0" err="1" smtClean="0"/>
+              <a:t>int</a:t>
+            </a:r>
+            <a:r>
+              <a:rPr lang="en-US" sz="800" dirty="0" smtClean="0"/>
+              <a:t> </a:t>
+            </a:r>
+            <a:r>
+              <a:rPr lang="en-US" sz="800" dirty="0" err="1" smtClean="0"/>
+              <a:t>sortOption</a:t>
+            </a:r>
+            <a:endParaRPr lang="en-US" sz="800" dirty="0" smtClean="0"/>
+          </a:p>
+          <a:p>
+            <a:r>
+              <a:rPr lang="en-US" sz="800" dirty="0" smtClean="0"/>
+              <a:t>-&gt; </a:t>
+            </a:r>
+            <a:r>
+              <a:rPr lang="en-US" sz="800" dirty="0" err="1" smtClean="0"/>
+              <a:t>int</a:t>
+            </a:r>
+            <a:r>
+              <a:rPr lang="en-US" sz="800" dirty="0" smtClean="0"/>
+              <a:t> </a:t>
+            </a:r>
+            <a:r>
+              <a:rPr lang="en-US" sz="800" dirty="0" err="1" smtClean="0"/>
+              <a:t>sortArray</a:t>
+            </a:r>
+            <a:r>
+              <a:rPr lang="en-US" sz="800" dirty="0" smtClean="0"/>
+              <a:t>[]</a:t>
+            </a:r>
+          </a:p>
+          <a:p>
+            <a:r>
+              <a:rPr lang="en-US" sz="800" dirty="0" smtClean="0"/>
+              <a:t>&lt;- time</a:t>
+            </a:r>
+          </a:p>
+        </p:txBody>
+      </p:sp>
+      <p:cxnSp>
+        <p:nvCxnSpPr>
+          <p:cNvPr id="48" name="Elbow Connector 47"/>
+          <p:cNvCxnSpPr>
+            <a:stCxn id="20" idx="3"/>
+            <a:endCxn id="21" idx="1"/>
+          </p:cNvCxnSpPr>
+          <p:nvPr/>
+        </p:nvCxnSpPr>
+        <p:spPr>
+          <a:xfrm flipV="1">
+            <a:off x="3404516" y="2317912"/>
+            <a:ext cx="1467771" cy="800633"/>
+          </a:xfrm>
+          <a:prstGeom prst="bentConnector3">
+            <a:avLst>
+              <a:gd name="adj1" fmla="val 50000"/>
+            </a:avLst>
+          </a:prstGeom>
+          <a:ln w="12700" cmpd="sng">
+            <a:solidFill>
+              <a:srgbClr val="000000"/>
+            </a:solidFill>
+          </a:ln>
+          <a:effectLst/>
+        </p:spPr>
+        <p:style>
+          <a:lnRef idx="2">
+            <a:schemeClr val="accent1"/>
+          </a:lnRef>
+          <a:fillRef idx="0">
+            <a:schemeClr val="accent1"/>
+          </a:fillRef>
+          <a:effectRef idx="1">
+            <a:schemeClr val="accent1"/>
+          </a:effectRef>
+          <a:fontRef idx="minor">
+            <a:schemeClr val="tx1"/>
+          </a:fontRef>
+        </p:style>
+      </p:cxnSp>
+      <p:cxnSp>
+        <p:nvCxnSpPr>
+          <p:cNvPr id="51" name="Elbow Connector 50"/>
+          <p:cNvCxnSpPr>
+            <a:stCxn id="20" idx="3"/>
+            <a:endCxn id="22" idx="1"/>
+          </p:cNvCxnSpPr>
+          <p:nvPr/>
+        </p:nvCxnSpPr>
+        <p:spPr>
+          <a:xfrm flipV="1">
+            <a:off x="3404516" y="2843291"/>
+            <a:ext cx="1467771" cy="275254"/>
+          </a:xfrm>
+          <a:prstGeom prst="bentConnector3">
+            <a:avLst>
+              <a:gd name="adj1" fmla="val 50000"/>
+            </a:avLst>
+          </a:prstGeom>
+          <a:ln w="12700" cmpd="sng">
+            <a:solidFill>
+              <a:srgbClr val="000000"/>
+            </a:solidFill>
+          </a:ln>
+          <a:effectLst/>
+        </p:spPr>
+        <p:style>
+          <a:lnRef idx="2">
+            <a:schemeClr val="accent1"/>
+          </a:lnRef>
+          <a:fillRef idx="0">
+            <a:schemeClr val="accent1"/>
+          </a:fillRef>
+          <a:effectRef idx="1">
+            <a:schemeClr val="accent1"/>
+          </a:effectRef>
+          <a:fontRef idx="minor">
+            <a:schemeClr val="tx1"/>
+          </a:fontRef>
+        </p:style>
+      </p:cxnSp>
+      <p:cxnSp>
+        <p:nvCxnSpPr>
+          <p:cNvPr id="54" name="Elbow Connector 53"/>
+          <p:cNvCxnSpPr>
+            <a:stCxn id="20" idx="3"/>
+            <a:endCxn id="23" idx="1"/>
+          </p:cNvCxnSpPr>
+          <p:nvPr/>
+        </p:nvCxnSpPr>
+        <p:spPr>
+          <a:xfrm>
+            <a:off x="3404516" y="3118545"/>
+            <a:ext cx="1467771" cy="279753"/>
+          </a:xfrm>
+          <a:prstGeom prst="bentConnector3">
+            <a:avLst>
+              <a:gd name="adj1" fmla="val 50000"/>
+            </a:avLst>
+          </a:prstGeom>
+          <a:ln w="12700" cmpd="sng">
+            <a:solidFill>
+              <a:srgbClr val="000000"/>
+            </a:solidFill>
+          </a:ln>
+          <a:effectLst/>
+        </p:spPr>
+        <p:style>
+          <a:lnRef idx="2">
+            <a:schemeClr val="accent1"/>
+          </a:lnRef>
+          <a:fillRef idx="0">
+            <a:schemeClr val="accent1"/>
+          </a:fillRef>
+          <a:effectRef idx="1">
+            <a:schemeClr val="accent1"/>
+          </a:effectRef>
+          <a:fontRef idx="minor">
+            <a:schemeClr val="tx1"/>
+          </a:fontRef>
+        </p:style>
+      </p:cxnSp>
+      <p:cxnSp>
+        <p:nvCxnSpPr>
+          <p:cNvPr id="57" name="Elbow Connector 56"/>
+          <p:cNvCxnSpPr>
+            <a:stCxn id="20" idx="3"/>
+            <a:endCxn id="27" idx="1"/>
+          </p:cNvCxnSpPr>
+          <p:nvPr/>
+        </p:nvCxnSpPr>
+        <p:spPr>
+          <a:xfrm>
+            <a:off x="3404516" y="3118545"/>
+            <a:ext cx="1467771" cy="832769"/>
+          </a:xfrm>
+          <a:prstGeom prst="bentConnector3">
+            <a:avLst>
+              <a:gd name="adj1" fmla="val 50000"/>
+            </a:avLst>
+          </a:prstGeom>
+          <a:ln w="12700" cmpd="sng">
+            <a:solidFill>
+              <a:srgbClr val="000000"/>
+            </a:solidFill>
+          </a:ln>
+          <a:effectLst/>
+        </p:spPr>
+        <p:style>
+          <a:lnRef idx="2">
+            <a:schemeClr val="accent1"/>
+          </a:lnRef>
+          <a:fillRef idx="0">
+            <a:schemeClr val="accent1"/>
+          </a:fillRef>
+          <a:effectRef idx="1">
+            <a:schemeClr val="accent1"/>
+          </a:effectRef>
+          <a:fontRef idx="minor">
+            <a:schemeClr val="tx1"/>
+          </a:fontRef>
+        </p:style>
+      </p:cxnSp>
+      <p:sp>
+        <p:nvSpPr>
+          <p:cNvPr id="61" name="TextBox 60"/>
+          <p:cNvSpPr txBox="1"/>
+          <p:nvPr/>
+        </p:nvSpPr>
+        <p:spPr>
+          <a:xfrm>
+            <a:off x="3344588" y="2909379"/>
+            <a:ext cx="879117" cy="215444"/>
+          </a:xfrm>
+          <a:prstGeom prst="rect">
+            <a:avLst/>
+          </a:prstGeom>
+          <a:noFill/>
+        </p:spPr>
+        <p:txBody>
+          <a:bodyPr wrap="none" rtlCol="0">
+            <a:spAutoFit/>
+          </a:bodyPr>
+          <a:lstStyle/>
+          <a:p>
+            <a:r>
+              <a:rPr lang="en-US" sz="800" dirty="0" smtClean="0"/>
+              <a:t>-&gt; </a:t>
+            </a:r>
+            <a:r>
+              <a:rPr lang="en-US" sz="800" dirty="0" err="1" smtClean="0"/>
+              <a:t>int</a:t>
+            </a:r>
+            <a:r>
+              <a:rPr lang="en-US" sz="800" dirty="0" smtClean="0"/>
+              <a:t> </a:t>
+            </a:r>
+            <a:r>
+              <a:rPr lang="en-US" sz="800" dirty="0" err="1" smtClean="0"/>
+              <a:t>sortArray</a:t>
+            </a:r>
+            <a:r>
+              <a:rPr lang="en-US" sz="800" dirty="0" smtClean="0"/>
+              <a:t>[]</a:t>
+            </a:r>
+          </a:p>
+        </p:txBody>
+      </p:sp>
+      <p:sp>
+        <p:nvSpPr>
+          <p:cNvPr id="62" name="Rectangle 61"/>
+          <p:cNvSpPr/>
+          <p:nvPr/>
+        </p:nvSpPr>
+        <p:spPr>
+          <a:xfrm>
+            <a:off x="2629835" y="3796004"/>
+            <a:ext cx="774681" cy="312095"/>
+          </a:xfrm>
+          <a:prstGeom prst="rect">
+            <a:avLst/>
+          </a:prstGeom>
+          <a:noFill/>
+          <a:ln>
+            <a:solidFill>
+              <a:schemeClr val="tx1"/>
+            </a:solidFill>
+          </a:ln>
+          <a:effectLst/>
+        </p:spPr>
+        <p:style>
+          <a:lnRef idx="1">
+            <a:schemeClr val="accent1"/>
+          </a:lnRef>
+          <a:fillRef idx="3">
+            <a:schemeClr val="accent1"/>
+          </a:fillRef>
+          <a:effectRef idx="2">
+            <a:schemeClr val="accent1"/>
+          </a:effectRef>
+          <a:fontRef idx="minor">
+            <a:schemeClr val="lt1"/>
+          </a:fontRef>
+        </p:style>
+        <p:txBody>
+          <a:bodyPr rtlCol="0" anchor="ctr"/>
+          <a:lstStyle/>
+          <a:p>
+            <a:pPr algn="ctr"/>
+            <a:r>
+              <a:rPr lang="en-US" sz="1000" dirty="0" smtClean="0">
+                <a:solidFill>
+                  <a:schemeClr val="tx1"/>
+                </a:solidFill>
+              </a:rPr>
+              <a:t>validate()</a:t>
+            </a:r>
+            <a:endParaRPr lang="en-US" sz="1000" dirty="0">
+              <a:solidFill>
+                <a:schemeClr val="tx1"/>
+              </a:solidFill>
+            </a:endParaRPr>
+          </a:p>
+        </p:txBody>
+      </p:sp>
+      <p:cxnSp>
+        <p:nvCxnSpPr>
+          <p:cNvPr id="63" name="Elbow Connector 62"/>
+          <p:cNvCxnSpPr>
+            <a:stCxn id="5" idx="3"/>
+            <a:endCxn id="62" idx="1"/>
+          </p:cNvCxnSpPr>
+          <p:nvPr/>
+        </p:nvCxnSpPr>
+        <p:spPr>
+          <a:xfrm>
+            <a:off x="1131375" y="3262579"/>
+            <a:ext cx="1498460" cy="689473"/>
+          </a:xfrm>
+          <a:prstGeom prst="bentConnector3">
+            <a:avLst>
+              <a:gd name="adj1" fmla="val 50000"/>
+            </a:avLst>
+          </a:prstGeom>
+          <a:ln w="12700" cmpd="sng">
+            <a:solidFill>
+              <a:srgbClr val="000000"/>
+            </a:solidFill>
+          </a:ln>
+          <a:effectLst/>
+        </p:spPr>
+        <p:style>
+          <a:lnRef idx="2">
+            <a:schemeClr val="accent1"/>
+          </a:lnRef>
+          <a:fillRef idx="0">
+            <a:schemeClr val="accent1"/>
+          </a:fillRef>
+          <a:effectRef idx="1">
+            <a:schemeClr val="accent1"/>
+          </a:effectRef>
+          <a:fontRef idx="minor">
+            <a:schemeClr val="tx1"/>
+          </a:fontRef>
+        </p:style>
+      </p:cxnSp>
+      <p:sp>
+        <p:nvSpPr>
+          <p:cNvPr id="66" name="TextBox 65"/>
+          <p:cNvSpPr txBox="1"/>
+          <p:nvPr/>
+        </p:nvSpPr>
+        <p:spPr>
+          <a:xfrm>
+            <a:off x="1864485" y="3938084"/>
+            <a:ext cx="887382" cy="215444"/>
+          </a:xfrm>
+          <a:prstGeom prst="rect">
+            <a:avLst/>
+          </a:prstGeom>
+          <a:noFill/>
+        </p:spPr>
+        <p:txBody>
+          <a:bodyPr wrap="none" rtlCol="0">
+            <a:spAutoFit/>
+          </a:bodyPr>
+          <a:lstStyle/>
+          <a:p>
+            <a:r>
+              <a:rPr lang="en-US" sz="800" dirty="0" smtClean="0"/>
+              <a:t>-&gt;</a:t>
+            </a:r>
+            <a:r>
+              <a:rPr lang="en-US" sz="800" dirty="0" err="1" smtClean="0"/>
+              <a:t>int</a:t>
+            </a:r>
+            <a:r>
+              <a:rPr lang="en-US" sz="800" dirty="0" smtClean="0"/>
+              <a:t> </a:t>
+            </a:r>
+            <a:r>
+              <a:rPr lang="en-US" sz="800" dirty="0" err="1" smtClean="0"/>
+              <a:t>sortArray</a:t>
+            </a:r>
+            <a:r>
+              <a:rPr lang="en-US" sz="800" dirty="0" smtClean="0"/>
+              <a:t>[]</a:t>
+            </a:r>
+          </a:p>
+        </p:txBody>
+      </p:sp>
+      <p:sp>
+        <p:nvSpPr>
+          <p:cNvPr id="67" name="Rectangle 66"/>
+          <p:cNvSpPr/>
+          <p:nvPr/>
+        </p:nvSpPr>
+        <p:spPr>
+          <a:xfrm>
+            <a:off x="2438604" y="4476181"/>
+            <a:ext cx="965912" cy="312095"/>
+          </a:xfrm>
+          <a:prstGeom prst="rect">
+            <a:avLst/>
+          </a:prstGeom>
+          <a:noFill/>
+          <a:ln>
+            <a:solidFill>
+              <a:schemeClr val="tx1"/>
+            </a:solidFill>
+          </a:ln>
+          <a:effectLst/>
+        </p:spPr>
+        <p:style>
+          <a:lnRef idx="1">
+            <a:schemeClr val="accent1"/>
+          </a:lnRef>
+          <a:fillRef idx="3">
+            <a:schemeClr val="accent1"/>
+          </a:fillRef>
+          <a:effectRef idx="2">
+            <a:schemeClr val="accent1"/>
+          </a:effectRef>
+          <a:fontRef idx="minor">
+            <a:schemeClr val="lt1"/>
+          </a:fontRef>
+        </p:style>
+        <p:txBody>
+          <a:bodyPr rtlCol="0" anchor="ctr"/>
+          <a:lstStyle/>
+          <a:p>
+            <a:pPr algn="ctr"/>
+            <a:r>
+              <a:rPr lang="en-US" sz="1000" dirty="0" err="1" smtClean="0">
+                <a:solidFill>
+                  <a:schemeClr val="tx1"/>
+                </a:solidFill>
+              </a:rPr>
+              <a:t>getAvgTime</a:t>
+            </a:r>
+            <a:r>
+              <a:rPr lang="en-US" sz="1000" dirty="0" smtClean="0">
+                <a:solidFill>
+                  <a:schemeClr val="tx1"/>
+                </a:solidFill>
+              </a:rPr>
+              <a:t>()</a:t>
+            </a:r>
+            <a:endParaRPr lang="en-US" sz="1000" dirty="0">
+              <a:solidFill>
+                <a:schemeClr val="tx1"/>
+              </a:solidFill>
+            </a:endParaRPr>
+          </a:p>
+        </p:txBody>
+      </p:sp>
+      <p:cxnSp>
+        <p:nvCxnSpPr>
+          <p:cNvPr id="68" name="Elbow Connector 67"/>
+          <p:cNvCxnSpPr>
+            <a:stCxn id="5" idx="3"/>
+            <a:endCxn id="67" idx="1"/>
+          </p:cNvCxnSpPr>
+          <p:nvPr/>
+        </p:nvCxnSpPr>
+        <p:spPr>
+          <a:xfrm>
+            <a:off x="1131375" y="3262579"/>
+            <a:ext cx="1307229" cy="1369650"/>
+          </a:xfrm>
+          <a:prstGeom prst="bentConnector3">
+            <a:avLst>
+              <a:gd name="adj1" fmla="val 50000"/>
+            </a:avLst>
+          </a:prstGeom>
+          <a:ln w="12700" cmpd="sng">
+            <a:solidFill>
+              <a:srgbClr val="000000"/>
+            </a:solidFill>
+          </a:ln>
+          <a:effectLst/>
+        </p:spPr>
+        <p:style>
+          <a:lnRef idx="2">
+            <a:schemeClr val="accent1"/>
+          </a:lnRef>
+          <a:fillRef idx="0">
+            <a:schemeClr val="accent1"/>
+          </a:fillRef>
+          <a:effectRef idx="1">
+            <a:schemeClr val="accent1"/>
+          </a:effectRef>
+          <a:fontRef idx="minor">
+            <a:schemeClr val="tx1"/>
+          </a:fontRef>
+        </p:style>
+      </p:cxnSp>
+      <p:sp>
+        <p:nvSpPr>
+          <p:cNvPr id="71" name="Rectangle 70"/>
+          <p:cNvSpPr/>
+          <p:nvPr/>
+        </p:nvSpPr>
+        <p:spPr>
+          <a:xfrm>
+            <a:off x="3025301" y="5115125"/>
+            <a:ext cx="965912" cy="312095"/>
+          </a:xfrm>
+          <a:prstGeom prst="rect">
+            <a:avLst/>
+          </a:prstGeom>
+          <a:noFill/>
+          <a:ln>
+            <a:solidFill>
+              <a:schemeClr val="tx1"/>
+            </a:solidFill>
+          </a:ln>
+          <a:effectLst/>
+        </p:spPr>
+        <p:style>
+          <a:lnRef idx="1">
+            <a:schemeClr val="accent1"/>
+          </a:lnRef>
+          <a:fillRef idx="3">
+            <a:schemeClr val="accent1"/>
+          </a:fillRef>
+          <a:effectRef idx="2">
+            <a:schemeClr val="accent1"/>
+          </a:effectRef>
+          <a:fontRef idx="minor">
+            <a:schemeClr val="lt1"/>
+          </a:fontRef>
+        </p:style>
+        <p:txBody>
+          <a:bodyPr rtlCol="0" anchor="ctr"/>
+          <a:lstStyle/>
+          <a:p>
+            <a:pPr algn="ctr"/>
+            <a:r>
+              <a:rPr lang="en-US" sz="1000" dirty="0" err="1" smtClean="0">
+                <a:solidFill>
+                  <a:schemeClr val="tx1"/>
+                </a:solidFill>
+              </a:rPr>
+              <a:t>printResults</a:t>
+            </a:r>
+            <a:r>
+              <a:rPr lang="en-US" sz="1000" dirty="0" smtClean="0">
+                <a:solidFill>
+                  <a:schemeClr val="tx1"/>
+                </a:solidFill>
+              </a:rPr>
+              <a:t>()</a:t>
+            </a:r>
+            <a:endParaRPr lang="en-US" sz="1000" dirty="0">
+              <a:solidFill>
+                <a:schemeClr val="tx1"/>
+              </a:solidFill>
+            </a:endParaRPr>
+          </a:p>
+        </p:txBody>
+      </p:sp>
+      <p:cxnSp>
+        <p:nvCxnSpPr>
+          <p:cNvPr id="72" name="Elbow Connector 71"/>
+          <p:cNvCxnSpPr>
+            <a:stCxn id="5" idx="3"/>
+            <a:endCxn id="71" idx="1"/>
+          </p:cNvCxnSpPr>
+          <p:nvPr/>
+        </p:nvCxnSpPr>
+        <p:spPr>
+          <a:xfrm>
+            <a:off x="1131375" y="3262579"/>
+            <a:ext cx="1893926" cy="2008594"/>
+          </a:xfrm>
+          <a:prstGeom prst="bentConnector3">
+            <a:avLst>
+              <a:gd name="adj1" fmla="val 23002"/>
+            </a:avLst>
+          </a:prstGeom>
+          <a:ln w="12700" cmpd="sng">
+            <a:solidFill>
+              <a:srgbClr val="000000"/>
+            </a:solidFill>
+          </a:ln>
+          <a:effectLst/>
+        </p:spPr>
+        <p:style>
+          <a:lnRef idx="2">
+            <a:schemeClr val="accent1"/>
+          </a:lnRef>
+          <a:fillRef idx="0">
+            <a:schemeClr val="accent1"/>
+          </a:fillRef>
+          <a:effectRef idx="1">
+            <a:schemeClr val="accent1"/>
+          </a:effectRef>
+          <a:fontRef idx="minor">
+            <a:schemeClr val="tx1"/>
+          </a:fontRef>
+        </p:style>
+      </p:cxnSp>
+      <p:sp>
+        <p:nvSpPr>
+          <p:cNvPr id="75" name="TextBox 74"/>
+          <p:cNvSpPr txBox="1"/>
+          <p:nvPr/>
+        </p:nvSpPr>
+        <p:spPr>
+          <a:xfrm>
+            <a:off x="1619732" y="5256902"/>
+            <a:ext cx="983062" cy="461665"/>
+          </a:xfrm>
+          <a:prstGeom prst="rect">
+            <a:avLst/>
+          </a:prstGeom>
+          <a:noFill/>
+        </p:spPr>
+        <p:txBody>
+          <a:bodyPr wrap="none" rtlCol="0">
+            <a:spAutoFit/>
+          </a:bodyPr>
+          <a:lstStyle/>
+          <a:p>
+            <a:r>
+              <a:rPr lang="en-US" sz="800" dirty="0" smtClean="0"/>
+              <a:t>-&gt;</a:t>
+            </a:r>
+            <a:r>
+              <a:rPr lang="en-US" sz="800" dirty="0" err="1" smtClean="0"/>
+              <a:t>int</a:t>
+            </a:r>
+            <a:r>
+              <a:rPr lang="en-US" sz="800" dirty="0" smtClean="0"/>
+              <a:t> options</a:t>
+            </a:r>
+          </a:p>
+          <a:p>
+            <a:r>
+              <a:rPr lang="en-US" sz="800" dirty="0" smtClean="0"/>
+              <a:t>-&gt;double avgTime1</a:t>
+            </a:r>
+          </a:p>
+          <a:p>
+            <a:r>
+              <a:rPr lang="en-US" sz="800" dirty="0" smtClean="0"/>
+              <a:t>-&gt;double avgTime2</a:t>
+            </a:r>
+          </a:p>
+        </p:txBody>
+      </p:sp>
+      <p:sp>
+        <p:nvSpPr>
+          <p:cNvPr id="78" name="Rectangle 77"/>
+          <p:cNvSpPr/>
+          <p:nvPr/>
+        </p:nvSpPr>
+        <p:spPr>
+          <a:xfrm>
+            <a:off x="2438604" y="6059189"/>
+            <a:ext cx="965912" cy="312095"/>
+          </a:xfrm>
+          <a:prstGeom prst="rect">
+            <a:avLst/>
+          </a:prstGeom>
+          <a:noFill/>
+          <a:ln>
+            <a:solidFill>
+              <a:schemeClr val="tx1"/>
+            </a:solidFill>
+          </a:ln>
+          <a:effectLst/>
+        </p:spPr>
+        <p:style>
+          <a:lnRef idx="1">
+            <a:schemeClr val="accent1"/>
+          </a:lnRef>
+          <a:fillRef idx="3">
+            <a:schemeClr val="accent1"/>
+          </a:fillRef>
+          <a:effectRef idx="2">
+            <a:schemeClr val="accent1"/>
+          </a:effectRef>
+          <a:fontRef idx="minor">
+            <a:schemeClr val="lt1"/>
+          </a:fontRef>
+        </p:style>
+        <p:txBody>
+          <a:bodyPr rtlCol="0" anchor="ctr"/>
+          <a:lstStyle/>
+          <a:p>
+            <a:pPr algn="ctr"/>
+            <a:r>
+              <a:rPr lang="en-US" sz="1000" dirty="0" err="1" smtClean="0">
+                <a:solidFill>
+                  <a:schemeClr val="tx1"/>
+                </a:solidFill>
+              </a:rPr>
+              <a:t>freeMemory</a:t>
+            </a:r>
+            <a:r>
+              <a:rPr lang="en-US" sz="1000" dirty="0" smtClean="0">
+                <a:solidFill>
+                  <a:schemeClr val="tx1"/>
+                </a:solidFill>
+              </a:rPr>
+              <a:t>()</a:t>
+            </a:r>
+            <a:endParaRPr lang="en-US" sz="1000" dirty="0">
+              <a:solidFill>
+                <a:schemeClr val="tx1"/>
+              </a:solidFill>
+            </a:endParaRPr>
+          </a:p>
+        </p:txBody>
+      </p:sp>
+      <p:cxnSp>
+        <p:nvCxnSpPr>
+          <p:cNvPr id="79" name="Elbow Connector 78"/>
+          <p:cNvCxnSpPr>
+            <a:stCxn id="5" idx="3"/>
+            <a:endCxn id="78" idx="1"/>
+          </p:cNvCxnSpPr>
+          <p:nvPr/>
+        </p:nvCxnSpPr>
+        <p:spPr>
+          <a:xfrm>
+            <a:off x="1131375" y="3262579"/>
+            <a:ext cx="1307229" cy="2952658"/>
+          </a:xfrm>
+          <a:prstGeom prst="bentConnector3">
+            <a:avLst>
+              <a:gd name="adj1" fmla="val 16563"/>
+            </a:avLst>
+          </a:prstGeom>
+          <a:ln w="12700" cmpd="sng">
+            <a:solidFill>
+              <a:srgbClr val="000000"/>
+            </a:solidFill>
+          </a:ln>
+          <a:effectLst/>
+        </p:spPr>
+        <p:style>
+          <a:lnRef idx="2">
+            <a:schemeClr val="accent1"/>
+          </a:lnRef>
+          <a:fillRef idx="0">
+            <a:schemeClr val="accent1"/>
+          </a:fillRef>
+          <a:effectRef idx="1">
+            <a:schemeClr val="accent1"/>
+          </a:effectRef>
+          <a:fontRef idx="minor">
+            <a:schemeClr val="tx1"/>
+          </a:fontRef>
+        </p:style>
+      </p:cxnSp>
+      <p:sp>
+        <p:nvSpPr>
+          <p:cNvPr id="83" name="TextBox 82"/>
+          <p:cNvSpPr txBox="1"/>
+          <p:nvPr/>
+        </p:nvSpPr>
+        <p:spPr>
+          <a:xfrm>
+            <a:off x="1372954" y="6140451"/>
+            <a:ext cx="803375" cy="338554"/>
+          </a:xfrm>
+          <a:prstGeom prst="rect">
+            <a:avLst/>
+          </a:prstGeom>
+          <a:noFill/>
+        </p:spPr>
+        <p:txBody>
+          <a:bodyPr wrap="none" rtlCol="0">
+            <a:spAutoFit/>
+          </a:bodyPr>
+          <a:lstStyle/>
+          <a:p>
+            <a:r>
+              <a:rPr lang="en-US" sz="800" dirty="0" smtClean="0"/>
+              <a:t>-&gt;</a:t>
+            </a:r>
+            <a:r>
+              <a:rPr lang="en-US" sz="800" dirty="0" err="1" smtClean="0"/>
+              <a:t>int</a:t>
+            </a:r>
+            <a:r>
+              <a:rPr lang="en-US" sz="800" dirty="0" smtClean="0"/>
+              <a:t> </a:t>
+            </a:r>
+            <a:r>
+              <a:rPr lang="en-US" sz="800" dirty="0" err="1" smtClean="0"/>
+              <a:t>intArray</a:t>
+            </a:r>
+            <a:r>
+              <a:rPr lang="en-US" sz="800" dirty="0" smtClean="0"/>
+              <a:t>[]</a:t>
+            </a:r>
+          </a:p>
+          <a:p>
+            <a:r>
+              <a:rPr lang="en-US" sz="800" dirty="0" smtClean="0"/>
+              <a:t>-&gt;</a:t>
+            </a:r>
+            <a:r>
+              <a:rPr lang="en-US" sz="800" dirty="0" err="1" smtClean="0"/>
+              <a:t>int</a:t>
+            </a:r>
+            <a:r>
+              <a:rPr lang="en-US" sz="800" dirty="0" smtClean="0"/>
+              <a:t> size</a:t>
+            </a:r>
           </a:p>
         </p:txBody>
       </p:sp>

</xml_diff>